<commit_message>
Updated presentation with Heroku link
</commit_message>
<xml_diff>
--- a/QuickBase_CraftDemo_Presentation.pptx
+++ b/QuickBase_CraftDemo_Presentation.pptx
@@ -9,6 +9,7 @@
     <p:sldId id="259" r:id="rId6"/>
     <p:sldId id="261" r:id="rId7"/>
     <p:sldId id="268" r:id="rId8"/>
+    <p:sldId id="269" r:id="rId9"/>
   </p:sldIdLst>
   <p:sldSz cx="9144000" cy="6858000" type="screen4x3"/>
   <p:notesSz cx="6858000" cy="9144000"/>
@@ -130,7 +131,7 @@
 <p1510:revInfo xmlns:a="http://schemas.openxmlformats.org/drawingml/2006/main" xmlns:r="http://schemas.openxmlformats.org/officeDocument/2006/relationships" xmlns:p1510="http://schemas.microsoft.com/office/powerpoint/2015/10/main">
   <p1510:revLst>
     <p1510:client id="{4ED92929-D67F-4703-9BDD-BBDC3E06A5CA}" v="35" dt="2020-03-24T19:50:58.623"/>
-    <p1510:client id="{7C018BDC-5216-4674-B179-D0FED1C10B47}" v="2" dt="2020-03-24T19:53:48.046"/>
+    <p1510:client id="{7C018BDC-5216-4674-B179-D0FED1C10B47}" v="8" dt="2020-03-24T20:33:39.412"/>
   </p1510:revLst>
 </p1510:revInfo>
 </file>
@@ -385,7 +386,7 @@
   <pc:docChgLst>
     <pc:chgData name="Viral Patel" userId="0e01188d-4af2-4215-9866-2f8c7903ea5e" providerId="ADAL" clId="{7C018BDC-5216-4674-B179-D0FED1C10B47}"/>
     <pc:docChg chg="custSel addSld delSld modSld">
-      <pc:chgData name="Viral Patel" userId="0e01188d-4af2-4215-9866-2f8c7903ea5e" providerId="ADAL" clId="{7C018BDC-5216-4674-B179-D0FED1C10B47}" dt="2020-03-24T19:56:49.178" v="7" actId="2696"/>
+      <pc:chgData name="Viral Patel" userId="0e01188d-4af2-4215-9866-2f8c7903ea5e" providerId="ADAL" clId="{7C018BDC-5216-4674-B179-D0FED1C10B47}" dt="2020-03-24T20:33:39.412" v="40" actId="207"/>
       <pc:docMkLst>
         <pc:docMk/>
       </pc:docMkLst>
@@ -403,6 +404,53 @@
             <ac:spMk id="10" creationId="{00000000-0000-0000-0000-000000000000}"/>
           </ac:spMkLst>
         </pc:spChg>
+      </pc:sldChg>
+      <pc:sldChg chg="addSp delSp modSp add">
+        <pc:chgData name="Viral Patel" userId="0e01188d-4af2-4215-9866-2f8c7903ea5e" providerId="ADAL" clId="{7C018BDC-5216-4674-B179-D0FED1C10B47}" dt="2020-03-24T20:33:39.412" v="40" actId="207"/>
+        <pc:sldMkLst>
+          <pc:docMk/>
+          <pc:sldMk cId="1355278573" sldId="269"/>
+        </pc:sldMkLst>
+        <pc:spChg chg="del">
+          <ac:chgData name="Viral Patel" userId="0e01188d-4af2-4215-9866-2f8c7903ea5e" providerId="ADAL" clId="{7C018BDC-5216-4674-B179-D0FED1C10B47}" dt="2020-03-24T20:31:45.839" v="9" actId="478"/>
+          <ac:spMkLst>
+            <pc:docMk/>
+            <pc:sldMk cId="1355278573" sldId="269"/>
+            <ac:spMk id="4" creationId="{00000000-0000-0000-0000-000000000000}"/>
+          </ac:spMkLst>
+        </pc:spChg>
+        <pc:spChg chg="add mod">
+          <ac:chgData name="Viral Patel" userId="0e01188d-4af2-4215-9866-2f8c7903ea5e" providerId="ADAL" clId="{7C018BDC-5216-4674-B179-D0FED1C10B47}" dt="2020-03-24T20:32:10.861" v="13" actId="1076"/>
+          <ac:spMkLst>
+            <pc:docMk/>
+            <pc:sldMk cId="1355278573" sldId="269"/>
+            <ac:spMk id="6" creationId="{6065F28A-15F6-4DA5-8DD3-12E8F1B9ACC9}"/>
+          </ac:spMkLst>
+        </pc:spChg>
+        <pc:spChg chg="del">
+          <ac:chgData name="Viral Patel" userId="0e01188d-4af2-4215-9866-2f8c7903ea5e" providerId="ADAL" clId="{7C018BDC-5216-4674-B179-D0FED1C10B47}" dt="2020-03-24T20:33:24.670" v="37" actId="478"/>
+          <ac:spMkLst>
+            <pc:docMk/>
+            <pc:sldMk cId="1355278573" sldId="269"/>
+            <ac:spMk id="8" creationId="{1A003F73-DAC1-41A9-966E-9704EF2B2B71}"/>
+          </ac:spMkLst>
+        </pc:spChg>
+        <pc:spChg chg="add mod">
+          <ac:chgData name="Viral Patel" userId="0e01188d-4af2-4215-9866-2f8c7903ea5e" providerId="ADAL" clId="{7C018BDC-5216-4674-B179-D0FED1C10B47}" dt="2020-03-24T20:33:39.412" v="40" actId="207"/>
+          <ac:spMkLst>
+            <pc:docMk/>
+            <pc:sldMk cId="1355278573" sldId="269"/>
+            <ac:spMk id="9" creationId="{3F32B3F7-35AD-422C-976F-016525365A7C}"/>
+          </ac:spMkLst>
+        </pc:spChg>
+        <pc:picChg chg="del mod">
+          <ac:chgData name="Viral Patel" userId="0e01188d-4af2-4215-9866-2f8c7903ea5e" providerId="ADAL" clId="{7C018BDC-5216-4674-B179-D0FED1C10B47}" dt="2020-03-24T20:31:48.783" v="11" actId="478"/>
+          <ac:picMkLst>
+            <pc:docMk/>
+            <pc:sldMk cId="1355278573" sldId="269"/>
+            <ac:picMk id="5" creationId="{00000000-0000-0000-0000-000000000000}"/>
+          </ac:picMkLst>
+        </pc:picChg>
       </pc:sldChg>
       <pc:sldChg chg="delSp modSp add del">
         <pc:chgData name="Viral Patel" userId="0e01188d-4af2-4215-9866-2f8c7903ea5e" providerId="ADAL" clId="{7C018BDC-5216-4674-B179-D0FED1C10B47}" dt="2020-03-24T19:56:49.178" v="7" actId="2696"/>
@@ -2638,6 +2686,211 @@
 </p:sld>
 </file>
 
+<file path=ppt/slides/slide5.xml><?xml version="1.0" encoding="utf-8"?>
+<p:sld xmlns:a="http://schemas.openxmlformats.org/drawingml/2006/main" xmlns:r="http://schemas.openxmlformats.org/officeDocument/2006/relationships" xmlns:p="http://schemas.openxmlformats.org/presentationml/2006/main">
+  <p:cSld>
+    <p:spTree>
+      <p:nvGrpSpPr>
+        <p:cNvPr id="1" name=""/>
+        <p:cNvGrpSpPr/>
+        <p:nvPr/>
+      </p:nvGrpSpPr>
+      <p:grpSpPr>
+        <a:xfrm>
+          <a:off x="0" y="0"/>
+          <a:ext cx="0" cy="0"/>
+          <a:chOff x="0" y="0"/>
+          <a:chExt cx="0" cy="0"/>
+        </a:xfrm>
+      </p:grpSpPr>
+      <p:sp>
+        <p:nvSpPr>
+          <p:cNvPr id="7" name="TextBox 6"/>
+          <p:cNvSpPr txBox="1"/>
+          <p:nvPr/>
+        </p:nvSpPr>
+        <p:spPr>
+          <a:xfrm>
+            <a:off x="5821842" y="1530055"/>
+            <a:ext cx="3177015" cy="784830"/>
+          </a:xfrm>
+          <a:prstGeom prst="rect">
+            <a:avLst/>
+          </a:prstGeom>
+          <a:noFill/>
+        </p:spPr>
+        <p:txBody>
+          <a:bodyPr wrap="square" rtlCol="0">
+            <a:spAutoFit/>
+          </a:bodyPr>
+          <a:lstStyle/>
+          <a:p>
+            <a:pPr>
+              <a:lnSpc>
+                <a:spcPct val="80000"/>
+              </a:lnSpc>
+            </a:pPr>
+            <a:r>
+              <a:rPr lang="en-US" sz="5400" b="1" i="0" dirty="0">
+                <a:solidFill>
+                  <a:schemeClr val="bg1"/>
+                </a:solidFill>
+                <a:latin typeface="Avenir Next Regular"/>
+                <a:cs typeface="Avenir Next Regular"/>
+              </a:rPr>
+              <a:t>Hello.</a:t>
+            </a:r>
+            <a:endParaRPr lang="en-US" sz="5400" b="0" i="0" dirty="0">
+              <a:solidFill>
+                <a:schemeClr val="bg1"/>
+              </a:solidFill>
+              <a:latin typeface="Avenir Next Regular"/>
+              <a:cs typeface="Avenir Next Regular"/>
+            </a:endParaRPr>
+          </a:p>
+        </p:txBody>
+      </p:sp>
+      <p:sp>
+        <p:nvSpPr>
+          <p:cNvPr id="6" name="Hexagon 5">
+            <a:extLst>
+              <a:ext uri="{FF2B5EF4-FFF2-40B4-BE49-F238E27FC236}">
+                <a16:creationId xmlns:a16="http://schemas.microsoft.com/office/drawing/2014/main" id="{6065F28A-15F6-4DA5-8DD3-12E8F1B9ACC9}"/>
+              </a:ext>
+            </a:extLst>
+          </p:cNvPr>
+          <p:cNvSpPr/>
+          <p:nvPr/>
+        </p:nvSpPr>
+        <p:spPr>
+          <a:xfrm>
+            <a:off x="417285" y="2997516"/>
+            <a:ext cx="8309429" cy="862968"/>
+          </a:xfrm>
+          <a:prstGeom prst="hexagon">
+            <a:avLst/>
+          </a:prstGeom>
+          <a:solidFill>
+            <a:srgbClr val="60328B"/>
+          </a:solidFill>
+          <a:ln>
+            <a:noFill/>
+          </a:ln>
+          <a:effectLst/>
+        </p:spPr>
+        <p:style>
+          <a:lnRef idx="1">
+            <a:schemeClr val="accent1"/>
+          </a:lnRef>
+          <a:fillRef idx="3">
+            <a:schemeClr val="accent1"/>
+          </a:fillRef>
+          <a:effectRef idx="2">
+            <a:schemeClr val="accent1"/>
+          </a:effectRef>
+          <a:fontRef idx="minor">
+            <a:schemeClr val="lt1"/>
+          </a:fontRef>
+        </p:style>
+        <p:txBody>
+          <a:bodyPr rtlCol="0" anchor="ctr"/>
+          <a:lstStyle/>
+          <a:p>
+            <a:pPr algn="ctr"/>
+            <a:endParaRPr lang="en-US"/>
+          </a:p>
+        </p:txBody>
+      </p:sp>
+      <p:sp>
+        <p:nvSpPr>
+          <p:cNvPr id="9" name="TextBox 8">
+            <a:extLst>
+              <a:ext uri="{FF2B5EF4-FFF2-40B4-BE49-F238E27FC236}">
+                <a16:creationId xmlns:a16="http://schemas.microsoft.com/office/drawing/2014/main" id="{3F32B3F7-35AD-422C-976F-016525365A7C}"/>
+              </a:ext>
+            </a:extLst>
+          </p:cNvPr>
+          <p:cNvSpPr txBox="1"/>
+          <p:nvPr/>
+        </p:nvSpPr>
+        <p:spPr>
+          <a:xfrm>
+            <a:off x="1892501" y="3025812"/>
+            <a:ext cx="5358996" cy="806375"/>
+          </a:xfrm>
+          <a:prstGeom prst="rect">
+            <a:avLst/>
+          </a:prstGeom>
+          <a:noFill/>
+        </p:spPr>
+        <p:txBody>
+          <a:bodyPr wrap="square" rtlCol="0">
+            <a:spAutoFit/>
+          </a:bodyPr>
+          <a:lstStyle/>
+          <a:p>
+            <a:pPr algn="ctr">
+              <a:lnSpc>
+                <a:spcPct val="120000"/>
+              </a:lnSpc>
+            </a:pPr>
+            <a:r>
+              <a:rPr lang="en-US" sz="2000" b="1" dirty="0">
+                <a:solidFill>
+                  <a:schemeClr val="bg1"/>
+                </a:solidFill>
+                <a:latin typeface="Avenir Next Regular"/>
+                <a:cs typeface="Avenir Next Regular"/>
+              </a:rPr>
+              <a:t>Craft Demo Link:</a:t>
+            </a:r>
+          </a:p>
+          <a:p>
+            <a:pPr algn="ctr">
+              <a:lnSpc>
+                <a:spcPct val="120000"/>
+              </a:lnSpc>
+            </a:pPr>
+            <a:r>
+              <a:rPr lang="en-US" sz="2000" b="1" dirty="0">
+                <a:solidFill>
+                  <a:schemeClr val="bg1"/>
+                </a:solidFill>
+                <a:latin typeface="Avenir Next Regular"/>
+                <a:cs typeface="Avenir Next Regular"/>
+                <a:hlinkClick r:id="rId2">
+                  <a:extLst>
+                    <a:ext uri="{A12FA001-AC4F-418D-AE19-62706E023703}">
+                      <ahyp:hlinkClr xmlns:ahyp="http://schemas.microsoft.com/office/drawing/2018/hyperlinkcolor" val="tx"/>
+                    </a:ext>
+                  </a:extLst>
+                </a:hlinkClick>
+              </a:rPr>
+              <a:t>https://quick-base-field-builder.herokuapp.com/</a:t>
+            </a:r>
+            <a:endParaRPr lang="en-US" sz="2000" b="1" dirty="0">
+              <a:solidFill>
+                <a:schemeClr val="bg1"/>
+              </a:solidFill>
+              <a:latin typeface="Avenir Next Regular"/>
+              <a:cs typeface="Avenir Next Regular"/>
+            </a:endParaRPr>
+          </a:p>
+        </p:txBody>
+      </p:sp>
+    </p:spTree>
+    <p:extLst>
+      <p:ext uri="{BB962C8B-B14F-4D97-AF65-F5344CB8AC3E}">
+        <p14:creationId xmlns:p14="http://schemas.microsoft.com/office/powerpoint/2010/main" val="1355278573"/>
+      </p:ext>
+    </p:extLst>
+  </p:cSld>
+  <p:clrMapOvr>
+    <a:masterClrMapping/>
+  </p:clrMapOvr>
+</p:sld>
+</file>
+
 <file path=ppt/theme/theme1.xml><?xml version="1.0" encoding="utf-8"?>
 <a:theme xmlns:a="http://schemas.openxmlformats.org/drawingml/2006/main" name="QuickBase_PPT_Starter">
   <a:themeElements>
@@ -2959,12 +3212,12 @@
 </file>
 
 <file path=customXml/item1.xml><?xml version="1.0" encoding="utf-8"?>
-<p:properties xmlns:p="http://schemas.microsoft.com/office/2006/metadata/properties" xmlns:xsi="http://www.w3.org/2001/XMLSchema-instance" xmlns:pc="http://schemas.microsoft.com/office/infopath/2007/PartnerControls">
-  <documentManagement>
-    <PublishingExpirationDate xmlns="http://schemas.microsoft.com/sharepoint/v3" xsi:nil="true"/>
-    <PublishingStartDate xmlns="http://schemas.microsoft.com/sharepoint/v3" xsi:nil="true"/>
-  </documentManagement>
-</p:properties>
+<?mso-contentType ?>
+<FormTemplates xmlns="http://schemas.microsoft.com/sharepoint/v3/contenttype/forms">
+  <Display>DocumentLibraryForm</Display>
+  <Edit>DocumentLibraryForm</Edit>
+  <New>DocumentLibraryForm</New>
+</FormTemplates>
 </file>
 
 <file path=customXml/item2.xml><?xml version="1.0" encoding="utf-8"?>
@@ -3100,26 +3353,18 @@
 </file>
 
 <file path=customXml/item3.xml><?xml version="1.0" encoding="utf-8"?>
-<?mso-contentType ?>
-<FormTemplates xmlns="http://schemas.microsoft.com/sharepoint/v3/contenttype/forms">
-  <Display>DocumentLibraryForm</Display>
-  <Edit>DocumentLibraryForm</Edit>
-  <New>DocumentLibraryForm</New>
-</FormTemplates>
+<p:properties xmlns:p="http://schemas.microsoft.com/office/2006/metadata/properties" xmlns:xsi="http://www.w3.org/2001/XMLSchema-instance" xmlns:pc="http://schemas.microsoft.com/office/infopath/2007/PartnerControls">
+  <documentManagement>
+    <PublishingExpirationDate xmlns="http://schemas.microsoft.com/sharepoint/v3" xsi:nil="true"/>
+    <PublishingStartDate xmlns="http://schemas.microsoft.com/sharepoint/v3" xsi:nil="true"/>
+  </documentManagement>
+</p:properties>
 </file>
 
 <file path=customXml/itemProps1.xml><?xml version="1.0" encoding="utf-8"?>
-<ds:datastoreItem xmlns:ds="http://schemas.openxmlformats.org/officeDocument/2006/customXml" ds:itemID="{DB6C8D68-CAE8-4863-90D6-3B20D5072EB4}">
+<ds:datastoreItem xmlns:ds="http://schemas.openxmlformats.org/officeDocument/2006/customXml" ds:itemID="{E0605501-9F6A-4E21-AD29-AC5B45E31C6D}">
   <ds:schemaRefs>
-    <ds:schemaRef ds:uri="http://schemas.microsoft.com/sharepoint/v3"/>
-    <ds:schemaRef ds:uri="http://purl.org/dc/terms/"/>
-    <ds:schemaRef ds:uri="http://schemas.openxmlformats.org/package/2006/metadata/core-properties"/>
-    <ds:schemaRef ds:uri="http://purl.org/dc/dcmitype/"/>
-    <ds:schemaRef ds:uri="http://schemas.microsoft.com/office/infopath/2007/PartnerControls"/>
-    <ds:schemaRef ds:uri="http://purl.org/dc/elements/1.1/"/>
-    <ds:schemaRef ds:uri="http://schemas.microsoft.com/office/2006/metadata/properties"/>
-    <ds:schemaRef ds:uri="http://schemas.microsoft.com/office/2006/documentManagement/types"/>
-    <ds:schemaRef ds:uri="http://www.w3.org/XML/1998/namespace"/>
+    <ds:schemaRef ds:uri="http://schemas.microsoft.com/sharepoint/v3/contenttype/forms"/>
   </ds:schemaRefs>
 </ds:datastoreItem>
 </file>
@@ -3143,9 +3388,17 @@
 </file>
 
 <file path=customXml/itemProps3.xml><?xml version="1.0" encoding="utf-8"?>
-<ds:datastoreItem xmlns:ds="http://schemas.openxmlformats.org/officeDocument/2006/customXml" ds:itemID="{E0605501-9F6A-4E21-AD29-AC5B45E31C6D}">
+<ds:datastoreItem xmlns:ds="http://schemas.openxmlformats.org/officeDocument/2006/customXml" ds:itemID="{DB6C8D68-CAE8-4863-90D6-3B20D5072EB4}">
   <ds:schemaRefs>
-    <ds:schemaRef ds:uri="http://schemas.microsoft.com/sharepoint/v3/contenttype/forms"/>
+    <ds:schemaRef ds:uri="http://schemas.microsoft.com/office/2006/metadata/properties"/>
+    <ds:schemaRef ds:uri="http://schemas.microsoft.com/office/2006/documentManagement/types"/>
+    <ds:schemaRef ds:uri="http://schemas.microsoft.com/sharepoint/v3"/>
+    <ds:schemaRef ds:uri="http://purl.org/dc/terms/"/>
+    <ds:schemaRef ds:uri="http://schemas.openxmlformats.org/package/2006/metadata/core-properties"/>
+    <ds:schemaRef ds:uri="http://purl.org/dc/dcmitype/"/>
+    <ds:schemaRef ds:uri="http://schemas.microsoft.com/office/infopath/2007/PartnerControls"/>
+    <ds:schemaRef ds:uri="http://purl.org/dc/elements/1.1/"/>
+    <ds:schemaRef ds:uri="http://www.w3.org/XML/1998/namespace"/>
   </ds:schemaRefs>
 </ds:datastoreItem>
 </file>
</xml_diff>